<commit_message>
makepresentation added, visual tweaks added
</commit_message>
<xml_diff>
--- a/Task1_PPTX_report/img_test_pres.pptx
+++ b/Task1_PPTX_report/img_test_pres.pptx
@@ -3128,7 +3128,7 @@
       </p:sp>
       <p:pic>
         <p:nvPicPr>
-          <p:cNvPr id="4" name="Picture 3" descr="test.png"/>
+          <p:cNvPr id="4" name="Picture 3" descr="picture.png"/>
           <p:cNvPicPr>
             <a:picLocks noChangeAspect="1"/>
           </p:cNvPicPr>
@@ -3142,7 +3142,7 @@
         </p:blipFill>
         <p:spPr>
           <a:xfrm>
-            <a:off x="914400" y="914400"/>
+            <a:off x="914400" y="1828800"/>
             <a:ext cx="4953000" cy="4114800"/>
           </a:xfrm>
           <a:prstGeom prst="rect">

</xml_diff>